<commit_message>
add resources and pdf
</commit_message>
<xml_diff>
--- a/presentation/pres.pptx
+++ b/presentation/pres.pptx
@@ -13532,8 +13532,8 @@
           </a:p>
         </p:txBody>
       </p:sp>
-      <mc:AlternateContent xmlns:mc="http://schemas.openxmlformats.org/markup-compatibility/2006">
-        <mc:Choice xmlns:a14="http://schemas.microsoft.com/office/drawing/2010/main" Requires="a14">
+      <mc:AlternateContent xmlns:mc="http://schemas.openxmlformats.org/markup-compatibility/2006" xmlns:a14="http://schemas.microsoft.com/office/drawing/2010/main">
+        <mc:Choice Requires="a14">
           <p:sp>
             <p:nvSpPr>
               <p:cNvPr id="6" name="Text Placeholder 1">
@@ -14113,7 +14113,7 @@
             </p:txBody>
           </p:sp>
         </mc:Choice>
-        <mc:Fallback>
+        <mc:Fallback xmlns="">
           <p:sp>
             <p:nvSpPr>
               <p:cNvPr id="6" name="Text Placeholder 1">
@@ -21154,8 +21154,8 @@
           </a:graphicData>
         </a:graphic>
       </p:graphicFrame>
-      <mc:AlternateContent xmlns:mc="http://schemas.openxmlformats.org/markup-compatibility/2006">
-        <mc:Choice xmlns:a14="http://schemas.microsoft.com/office/drawing/2010/main" Requires="a14">
+      <mc:AlternateContent xmlns:mc="http://schemas.openxmlformats.org/markup-compatibility/2006" xmlns:a14="http://schemas.microsoft.com/office/drawing/2010/main">
+        <mc:Choice Requires="a14">
           <p:graphicFrame>
             <p:nvGraphicFramePr>
               <p:cNvPr id="12" name="Table 11">
@@ -21555,7 +21555,7 @@
             </a:graphic>
           </p:graphicFrame>
         </mc:Choice>
-        <mc:Fallback>
+        <mc:Fallback xmlns="">
           <p:graphicFrame>
             <p:nvGraphicFramePr>
               <p:cNvPr id="12" name="Table 11">
@@ -21889,8 +21889,8 @@
           </p:graphicFrame>
         </mc:Fallback>
       </mc:AlternateContent>
-      <mc:AlternateContent xmlns:mc="http://schemas.openxmlformats.org/markup-compatibility/2006">
-        <mc:Choice xmlns:a14="http://schemas.microsoft.com/office/drawing/2010/main" Requires="a14">
+      <mc:AlternateContent xmlns:mc="http://schemas.openxmlformats.org/markup-compatibility/2006" xmlns:a14="http://schemas.microsoft.com/office/drawing/2010/main">
+        <mc:Choice Requires="a14">
           <p:graphicFrame>
             <p:nvGraphicFramePr>
               <p:cNvPr id="14" name="Table 13">
@@ -21982,19 +21982,7 @@
                                 <a:rPr lang="pl-PL" sz="1200" b="0" i="1" smtClean="0">
                                   <a:latin typeface="Cambria Math" panose="02040503050406030204" pitchFamily="18" charset="0"/>
                                 </a:rPr>
-                                <m:t>=0.</m:t>
-                              </m:r>
-                              <m:r>
-                                <a:rPr lang="pl-PL" sz="1200" b="0" i="1" smtClean="0">
-                                  <a:latin typeface="Cambria Math" panose="02040503050406030204" pitchFamily="18" charset="0"/>
-                                </a:rPr>
-                                <m:t>95</m:t>
-                              </m:r>
-                              <m:r>
-                                <a:rPr lang="pl-PL" sz="1200" b="0" i="1" smtClean="0">
-                                  <a:latin typeface="Cambria Math" panose="02040503050406030204" pitchFamily="18" charset="0"/>
-                                </a:rPr>
-                                <m:t>, </m:t>
+                                <m:t>=0.95, </m:t>
                               </m:r>
                               <m:sSub>
                                 <m:sSubPr>
@@ -22303,7 +22291,7 @@
             </a:graphic>
           </p:graphicFrame>
         </mc:Choice>
-        <mc:Fallback>
+        <mc:Fallback xmlns="">
           <p:graphicFrame>
             <p:nvGraphicFramePr>
               <p:cNvPr id="14" name="Table 13">
@@ -23049,8 +23037,8 @@
         </p:nvSpPr>
         <p:spPr>
           <a:xfrm>
-            <a:off x="843105" y="1334859"/>
-            <a:ext cx="7587619" cy="2959192"/>
+            <a:off x="843105" y="1334858"/>
+            <a:ext cx="7587619" cy="3808641"/>
           </a:xfrm>
           <a:prstGeom prst="rect">
             <a:avLst/>
@@ -23458,6 +23446,124 @@
               <a:t>. </a:t>
             </a:r>
             <a:endParaRPr lang="pl-PL" sz="1200" dirty="0"/>
+          </a:p>
+          <a:p>
+            <a:pPr marL="285750" indent="-285750">
+              <a:lnSpc>
+                <a:spcPct val="150000"/>
+              </a:lnSpc>
+            </a:pPr>
+            <a:r>
+              <a:rPr lang="pl-PL" sz="1200" b="1" dirty="0"/>
+              <a:t>[</a:t>
+            </a:r>
+            <a:r>
+              <a:rPr lang="pl-PL" sz="1200" b="1" dirty="0" err="1"/>
+              <a:t>Witten</a:t>
+            </a:r>
+            <a:r>
+              <a:rPr lang="pl-PL" sz="1200" b="1" dirty="0"/>
+              <a:t> &amp; Frank 2005] </a:t>
+            </a:r>
+            <a:r>
+              <a:rPr lang="en-US" sz="1200" dirty="0"/>
+              <a:t>Witten, I.H., and Frank</a:t>
+            </a:r>
+            <a:r>
+              <a:rPr lang="en-US" sz="1200" i="1" dirty="0"/>
+              <a:t>, </a:t>
+            </a:r>
+            <a:r>
+              <a:rPr lang="en-US" sz="1200" dirty="0"/>
+              <a:t>E. 2005</a:t>
+            </a:r>
+            <a:r>
+              <a:rPr lang="en-US" sz="1200" i="1" dirty="0"/>
+              <a:t>. Data Mining – Practical Machine Learning Tools and</a:t>
+            </a:r>
+            <a:r>
+              <a:rPr lang="pl-PL" sz="1200" i="1" dirty="0" err="1"/>
+              <a:t>Techniques</a:t>
+            </a:r>
+            <a:r>
+              <a:rPr lang="pl-PL" sz="1200" i="1" dirty="0"/>
+              <a:t> with Java </a:t>
+            </a:r>
+            <a:r>
+              <a:rPr lang="pl-PL" sz="1200" i="1" dirty="0" err="1"/>
+              <a:t>Implementations</a:t>
+            </a:r>
+            <a:r>
+              <a:rPr lang="pl-PL" sz="1200" i="1" dirty="0"/>
+              <a:t>.</a:t>
+            </a:r>
+          </a:p>
+          <a:p>
+            <a:pPr marL="285750" indent="-285750">
+              <a:lnSpc>
+                <a:spcPct val="150000"/>
+              </a:lnSpc>
+            </a:pPr>
+            <a:r>
+              <a:rPr lang="pl-PL" sz="1200" b="1" dirty="0"/>
+              <a:t>[</a:t>
+            </a:r>
+            <a:r>
+              <a:rPr lang="pl-PL" sz="1200" b="1" dirty="0" err="1"/>
+              <a:t>Sheng</a:t>
+            </a:r>
+            <a:r>
+              <a:rPr lang="pl-PL" sz="1200" b="1" dirty="0"/>
+              <a:t> &amp; Ling 2006] </a:t>
+            </a:r>
+            <a:r>
+              <a:rPr lang="en-US" sz="1200" dirty="0"/>
+              <a:t>Sheng, V.S. and Ling, C.X. 2006. </a:t>
+            </a:r>
+            <a:r>
+              <a:rPr lang="en-US" sz="1200" i="1" dirty="0"/>
+              <a:t>Thresholding for Making Classifiers Cost-sensitive. In</a:t>
+            </a:r>
+            <a:r>
+              <a:rPr lang="pl-PL" sz="1200" i="1" dirty="0"/>
+              <a:t> </a:t>
+            </a:r>
+            <a:r>
+              <a:rPr lang="en-US" sz="1200" i="1" dirty="0"/>
+              <a:t>Proceedings of the 21st National Conference on Artificial Intelligence</a:t>
+            </a:r>
+            <a:r>
+              <a:rPr lang="pl-PL" sz="1200" i="1" dirty="0"/>
+              <a:t>.</a:t>
+            </a:r>
+          </a:p>
+          <a:p>
+            <a:pPr marL="285750" indent="-285750">
+              <a:lnSpc>
+                <a:spcPct val="150000"/>
+              </a:lnSpc>
+            </a:pPr>
+            <a:r>
+              <a:rPr lang="pl-PL" sz="1200" b="1" dirty="0"/>
+              <a:t>[Domingos 1999] </a:t>
+            </a:r>
+            <a:r>
+              <a:rPr lang="en-US" sz="1200" dirty="0"/>
+              <a:t>Domingos, P. 1999</a:t>
+            </a:r>
+            <a:r>
+              <a:rPr lang="en-US" sz="1200" i="1" dirty="0"/>
+              <a:t>. </a:t>
+            </a:r>
+            <a:r>
+              <a:rPr lang="en-US" sz="1200" i="1" dirty="0" err="1"/>
+              <a:t>MetaCost</a:t>
+            </a:r>
+            <a:r>
+              <a:rPr lang="en-US" sz="1200" i="1" dirty="0"/>
+              <a:t>: A general method for making classifiers cost-sensitive.</a:t>
+            </a:r>
+            <a:endParaRPr lang="pl-PL" sz="1200" i="1" dirty="0"/>
           </a:p>
         </p:txBody>
       </p:sp>

</xml_diff>